<commit_message>
AST added to Implementation ppt
</commit_message>
<xml_diff>
--- a/doc/Design.pptx
+++ b/doc/Design.pptx
@@ -5,7 +5,7 @@
     <p:sldMasterId id="2147483648" r:id="rId1"/>
   </p:sldMasterIdLst>
   <p:notesMasterIdLst>
-    <p:notesMasterId r:id="rId11"/>
+    <p:notesMasterId r:id="rId13"/>
   </p:notesMasterIdLst>
   <p:sldIdLst>
     <p:sldId id="257" r:id="rId2"/>
@@ -15,8 +15,10 @@
     <p:sldId id="262" r:id="rId6"/>
     <p:sldId id="261" r:id="rId7"/>
     <p:sldId id="263" r:id="rId8"/>
-    <p:sldId id="268" r:id="rId9"/>
-    <p:sldId id="269" r:id="rId10"/>
+    <p:sldId id="271" r:id="rId9"/>
+    <p:sldId id="272" r:id="rId10"/>
+    <p:sldId id="269" r:id="rId11"/>
+    <p:sldId id="270" r:id="rId12"/>
   </p:sldIdLst>
   <p:sldSz cx="9144000" cy="6858000" type="screen4x3"/>
   <p:notesSz cx="6858000" cy="9144000"/>
@@ -201,7 +203,7 @@
             <a:fld id="{90EF70D0-ABC5-42FB-A680-563792D4BCC2}" type="datetimeFigureOut">
               <a:rPr lang="en-US" smtClean="0"/>
               <a:pPr/>
-              <a:t>4/29/15</a:t>
+              <a:t>4/29/2015</a:t>
             </a:fld>
             <a:endParaRPr lang="en-US"/>
           </a:p>
@@ -372,7 +374,7 @@
     </p:spTree>
     <p:extLst>
       <p:ext uri="{BB962C8B-B14F-4D97-AF65-F5344CB8AC3E}">
-        <p14:creationId xmlns:p14="http://schemas.microsoft.com/office/powerpoint/2010/main" val="927209169"/>
+        <p14:creationId xmlns="" xmlns:p14="http://schemas.microsoft.com/office/powerpoint/2010/main" val="927209169"/>
       </p:ext>
     </p:extLst>
   </p:cSld>
@@ -744,7 +746,7 @@
             <a:fld id="{1D8BD707-D9CF-40AE-B4C6-C98DA3205C09}" type="datetimeFigureOut">
               <a:rPr lang="en-US" smtClean="0"/>
               <a:pPr/>
-              <a:t>4/29/15</a:t>
+              <a:t>4/29/2015</a:t>
             </a:fld>
             <a:endParaRPr lang="en-US"/>
           </a:p>
@@ -911,7 +913,7 @@
             <a:fld id="{1D8BD707-D9CF-40AE-B4C6-C98DA3205C09}" type="datetimeFigureOut">
               <a:rPr lang="en-US" smtClean="0"/>
               <a:pPr/>
-              <a:t>4/29/15</a:t>
+              <a:t>4/29/2015</a:t>
             </a:fld>
             <a:endParaRPr lang="en-US"/>
           </a:p>
@@ -1088,7 +1090,7 @@
             <a:fld id="{1D8BD707-D9CF-40AE-B4C6-C98DA3205C09}" type="datetimeFigureOut">
               <a:rPr lang="en-US" smtClean="0"/>
               <a:pPr/>
-              <a:t>4/29/15</a:t>
+              <a:t>4/29/2015</a:t>
             </a:fld>
             <a:endParaRPr lang="en-US"/>
           </a:p>
@@ -1255,7 +1257,7 @@
             <a:fld id="{1D8BD707-D9CF-40AE-B4C6-C98DA3205C09}" type="datetimeFigureOut">
               <a:rPr lang="en-US" smtClean="0"/>
               <a:pPr/>
-              <a:t>4/29/15</a:t>
+              <a:t>4/29/2015</a:t>
             </a:fld>
             <a:endParaRPr lang="en-US"/>
           </a:p>
@@ -1498,7 +1500,7 @@
             <a:fld id="{1D8BD707-D9CF-40AE-B4C6-C98DA3205C09}" type="datetimeFigureOut">
               <a:rPr lang="en-US" smtClean="0"/>
               <a:pPr/>
-              <a:t>4/29/15</a:t>
+              <a:t>4/29/2015</a:t>
             </a:fld>
             <a:endParaRPr lang="en-US"/>
           </a:p>
@@ -1783,7 +1785,7 @@
             <a:fld id="{1D8BD707-D9CF-40AE-B4C6-C98DA3205C09}" type="datetimeFigureOut">
               <a:rPr lang="en-US" smtClean="0"/>
               <a:pPr/>
-              <a:t>4/29/15</a:t>
+              <a:t>4/29/2015</a:t>
             </a:fld>
             <a:endParaRPr lang="en-US"/>
           </a:p>
@@ -2202,7 +2204,7 @@
             <a:fld id="{1D8BD707-D9CF-40AE-B4C6-C98DA3205C09}" type="datetimeFigureOut">
               <a:rPr lang="en-US" smtClean="0"/>
               <a:pPr/>
-              <a:t>4/29/15</a:t>
+              <a:t>4/29/2015</a:t>
             </a:fld>
             <a:endParaRPr lang="en-US"/>
           </a:p>
@@ -2317,7 +2319,7 @@
             <a:fld id="{1D8BD707-D9CF-40AE-B4C6-C98DA3205C09}" type="datetimeFigureOut">
               <a:rPr lang="en-US" smtClean="0"/>
               <a:pPr/>
-              <a:t>4/29/15</a:t>
+              <a:t>4/29/2015</a:t>
             </a:fld>
             <a:endParaRPr lang="en-US"/>
           </a:p>
@@ -2409,7 +2411,7 @@
             <a:fld id="{1D8BD707-D9CF-40AE-B4C6-C98DA3205C09}" type="datetimeFigureOut">
               <a:rPr lang="en-US" smtClean="0"/>
               <a:pPr/>
-              <a:t>4/29/15</a:t>
+              <a:t>4/29/2015</a:t>
             </a:fld>
             <a:endParaRPr lang="en-US"/>
           </a:p>
@@ -2683,7 +2685,7 @@
             <a:fld id="{1D8BD707-D9CF-40AE-B4C6-C98DA3205C09}" type="datetimeFigureOut">
               <a:rPr lang="en-US" smtClean="0"/>
               <a:pPr/>
-              <a:t>4/29/15</a:t>
+              <a:t>4/29/2015</a:t>
             </a:fld>
             <a:endParaRPr lang="en-US"/>
           </a:p>
@@ -2933,7 +2935,7 @@
             <a:fld id="{1D8BD707-D9CF-40AE-B4C6-C98DA3205C09}" type="datetimeFigureOut">
               <a:rPr lang="en-US" smtClean="0"/>
               <a:pPr/>
-              <a:t>4/29/15</a:t>
+              <a:t>4/29/2015</a:t>
             </a:fld>
             <a:endParaRPr lang="en-US"/>
           </a:p>
@@ -3143,7 +3145,7 @@
             <a:fld id="{1D8BD707-D9CF-40AE-B4C6-C98DA3205C09}" type="datetimeFigureOut">
               <a:rPr lang="en-US" smtClean="0"/>
               <a:pPr/>
-              <a:t>4/29/15</a:t>
+              <a:t>4/29/2015</a:t>
             </a:fld>
             <a:endParaRPr lang="en-US"/>
           </a:p>
@@ -3699,6 +3701,215 @@
 </p:sld>
 </file>
 
+<file path=ppt/slides/slide10.xml><?xml version="1.0" encoding="utf-8"?>
+<p:sld xmlns:a="http://schemas.openxmlformats.org/drawingml/2006/main" xmlns:r="http://schemas.openxmlformats.org/officeDocument/2006/relationships" xmlns:p="http://schemas.openxmlformats.org/presentationml/2006/main">
+  <p:cSld>
+    <p:spTree>
+      <p:nvGrpSpPr>
+        <p:cNvPr id="1" name=""/>
+        <p:cNvGrpSpPr/>
+        <p:nvPr/>
+      </p:nvGrpSpPr>
+      <p:grpSpPr>
+        <a:xfrm>
+          <a:off x="0" y="0"/>
+          <a:ext cx="0" cy="0"/>
+          <a:chOff x="0" y="0"/>
+          <a:chExt cx="0" cy="0"/>
+        </a:xfrm>
+      </p:grpSpPr>
+      <p:sp>
+        <p:nvSpPr>
+          <p:cNvPr id="2" name="Title 1"/>
+          <p:cNvSpPr>
+            <a:spLocks noGrp="1"/>
+          </p:cNvSpPr>
+          <p:nvPr>
+            <p:ph type="title"/>
+          </p:nvPr>
+        </p:nvSpPr>
+        <p:spPr/>
+        <p:txBody>
+          <a:bodyPr/>
+          <a:lstStyle/>
+          <a:p>
+            <a:r>
+              <a:rPr lang="en-US" dirty="0" smtClean="0"/>
+              <a:t>Runtime - Features</a:t>
+            </a:r>
+            <a:endParaRPr lang="en-US" dirty="0"/>
+          </a:p>
+        </p:txBody>
+      </p:sp>
+      <p:sp>
+        <p:nvSpPr>
+          <p:cNvPr id="3" name="Content Placeholder 2"/>
+          <p:cNvSpPr>
+            <a:spLocks noGrp="1"/>
+          </p:cNvSpPr>
+          <p:nvPr>
+            <p:ph idx="1"/>
+          </p:nvPr>
+        </p:nvSpPr>
+        <p:spPr/>
+        <p:txBody>
+          <a:bodyPr>
+            <a:normAutofit fontScale="92500" lnSpcReduction="10000"/>
+          </a:bodyPr>
+          <a:lstStyle/>
+          <a:p>
+            <a:r>
+              <a:rPr lang="en-US" dirty="0" smtClean="0"/>
+              <a:t>RAMM’s Runtime is completely based on JAVA.</a:t>
+            </a:r>
+          </a:p>
+          <a:p>
+            <a:endParaRPr lang="en-US" dirty="0" smtClean="0"/>
+          </a:p>
+          <a:p>
+            <a:r>
+              <a:rPr lang="en-US" dirty="0" smtClean="0"/>
+              <a:t>It is dynamically typed.</a:t>
+            </a:r>
+          </a:p>
+          <a:p>
+            <a:endParaRPr lang="en-US" dirty="0" smtClean="0"/>
+          </a:p>
+          <a:p>
+            <a:r>
+              <a:rPr lang="en-US" dirty="0" smtClean="0"/>
+              <a:t>It internally uses stacks, linked lists and </a:t>
+            </a:r>
+            <a:r>
+              <a:rPr lang="en-US" dirty="0" err="1" smtClean="0"/>
+              <a:t>hashmaps</a:t>
+            </a:r>
+            <a:endParaRPr lang="en-US" dirty="0" smtClean="0"/>
+          </a:p>
+          <a:p>
+            <a:endParaRPr lang="en-US" dirty="0" smtClean="0"/>
+          </a:p>
+          <a:p>
+            <a:r>
+              <a:rPr lang="en-US" dirty="0" smtClean="0"/>
+              <a:t>The intermediate code is in prefix notation and the runtime is designed accordingly to process prefix expressions</a:t>
+            </a:r>
+          </a:p>
+          <a:p>
+            <a:endParaRPr lang="en-US" dirty="0" smtClean="0"/>
+          </a:p>
+          <a:p>
+            <a:endParaRPr lang="en-US" dirty="0" smtClean="0"/>
+          </a:p>
+          <a:p>
+            <a:endParaRPr lang="en-US" dirty="0" smtClean="0"/>
+          </a:p>
+          <a:p>
+            <a:endParaRPr lang="en-US" dirty="0"/>
+          </a:p>
+        </p:txBody>
+      </p:sp>
+    </p:spTree>
+    <p:extLst>
+      <p:ext uri="{BB962C8B-B14F-4D97-AF65-F5344CB8AC3E}">
+        <p14:creationId xmlns="" xmlns:p14="http://schemas.microsoft.com/office/powerpoint/2010/main" val="1488794544"/>
+      </p:ext>
+    </p:extLst>
+  </p:cSld>
+  <p:clrMapOvr>
+    <a:masterClrMapping/>
+  </p:clrMapOvr>
+</p:sld>
+</file>
+
+<file path=ppt/slides/slide11.xml><?xml version="1.0" encoding="utf-8"?>
+<p:sld xmlns:a="http://schemas.openxmlformats.org/drawingml/2006/main" xmlns:r="http://schemas.openxmlformats.org/officeDocument/2006/relationships" xmlns:p="http://schemas.openxmlformats.org/presentationml/2006/main">
+  <p:cSld>
+    <p:spTree>
+      <p:nvGrpSpPr>
+        <p:cNvPr id="1" name=""/>
+        <p:cNvGrpSpPr/>
+        <p:nvPr/>
+      </p:nvGrpSpPr>
+      <p:grpSpPr>
+        <a:xfrm>
+          <a:off x="0" y="0"/>
+          <a:ext cx="0" cy="0"/>
+          <a:chOff x="0" y="0"/>
+          <a:chExt cx="0" cy="0"/>
+        </a:xfrm>
+      </p:grpSpPr>
+      <p:sp>
+        <p:nvSpPr>
+          <p:cNvPr id="2" name="Title 1"/>
+          <p:cNvSpPr>
+            <a:spLocks noGrp="1"/>
+          </p:cNvSpPr>
+          <p:nvPr>
+            <p:ph type="title"/>
+          </p:nvPr>
+        </p:nvSpPr>
+        <p:spPr/>
+        <p:txBody>
+          <a:bodyPr/>
+          <a:lstStyle/>
+          <a:p>
+            <a:r>
+              <a:rPr lang="en-US" dirty="0"/>
+              <a:t>Runtime - Features</a:t>
+            </a:r>
+          </a:p>
+        </p:txBody>
+      </p:sp>
+      <p:sp>
+        <p:nvSpPr>
+          <p:cNvPr id="3" name="Content Placeholder 2"/>
+          <p:cNvSpPr>
+            <a:spLocks noGrp="1"/>
+          </p:cNvSpPr>
+          <p:nvPr>
+            <p:ph idx="1"/>
+          </p:nvPr>
+        </p:nvSpPr>
+        <p:spPr/>
+        <p:txBody>
+          <a:bodyPr>
+            <a:normAutofit fontScale="92500" lnSpcReduction="10000"/>
+          </a:bodyPr>
+          <a:lstStyle/>
+          <a:p>
+            <a:r>
+              <a:rPr lang="en-US" dirty="0" smtClean="0"/>
+              <a:t>A symbol table is a data structure used by a compiler where each identifier in a program's source code is associated with information relating to its declaration or appearance in the source, such as its type, scope level and sometimes its location.</a:t>
+            </a:r>
+          </a:p>
+          <a:p>
+            <a:r>
+              <a:rPr lang="en-US" dirty="0"/>
+              <a:t>During execution, every function call is recorded and maintained on a stack</a:t>
+            </a:r>
+            <a:r>
+              <a:rPr lang="en-US" dirty="0" smtClean="0"/>
+              <a:t>.</a:t>
+            </a:r>
+          </a:p>
+          <a:p>
+            <a:r>
+              <a:rPr lang="en-US" dirty="0" smtClean="0"/>
+              <a:t>In RAMM, the symbol table is implemented as a linked list of hash maps.</a:t>
+            </a:r>
+            <a:endParaRPr lang="en-US" dirty="0"/>
+          </a:p>
+        </p:txBody>
+      </p:sp>
+    </p:spTree>
+  </p:cSld>
+  <p:clrMapOvr>
+    <a:masterClrMapping/>
+  </p:clrMapOvr>
+</p:sld>
+</file>
+
 <file path=ppt/slides/slide2.xml><?xml version="1.0" encoding="utf-8"?>
 <p:sld xmlns:a="http://schemas.openxmlformats.org/drawingml/2006/main" xmlns:r="http://schemas.openxmlformats.org/officeDocument/2006/relationships" xmlns:p="http://schemas.openxmlformats.org/presentationml/2006/main">
   <p:cSld>
@@ -4469,23 +4680,64 @@
             <p:ph idx="1"/>
           </p:nvPr>
         </p:nvSpPr>
-        <p:spPr/>
+        <p:spPr>
+          <a:xfrm>
+            <a:off x="0" y="1600200"/>
+            <a:ext cx="9144000" cy="5257800"/>
+          </a:xfrm>
+        </p:spPr>
         <p:txBody>
           <a:bodyPr>
-            <a:normAutofit/>
+            <a:normAutofit fontScale="92500" lnSpcReduction="10000"/>
           </a:bodyPr>
           <a:lstStyle/>
           <a:p>
+            <a:r>
+              <a:rPr lang="en-US" dirty="0" smtClean="0"/>
+              <a:t>Our Intermediate code implements prefix notation.</a:t>
+            </a:r>
+          </a:p>
+          <a:p>
             <a:endParaRPr lang="en-US" dirty="0" smtClean="0"/>
           </a:p>
           <a:p>
+            <a:r>
+              <a:rPr lang="en-US" dirty="0" smtClean="0"/>
+              <a:t>For example, if we take our code a = 5, the intermediate code would look like:</a:t>
+            </a:r>
+          </a:p>
+          <a:p>
+            <a:pPr>
+              <a:buNone/>
+            </a:pPr>
+            <a:r>
+              <a:rPr lang="en-US" dirty="0" smtClean="0"/>
+              <a:t>	SET A 5</a:t>
+            </a:r>
+          </a:p>
+          <a:p>
             <a:endParaRPr lang="en-US" dirty="0" smtClean="0"/>
           </a:p>
           <a:p>
+            <a:r>
+              <a:rPr lang="en-US" dirty="0" smtClean="0"/>
+              <a:t>We have also used our own notations for comparisons and looping constructs.</a:t>
+            </a:r>
+          </a:p>
+          <a:p>
+            <a:pPr>
+              <a:buNone/>
+            </a:pPr>
             <a:endParaRPr lang="en-US" dirty="0" smtClean="0"/>
           </a:p>
           <a:p>
-            <a:endParaRPr lang="en-US" dirty="0"/>
+            <a:pPr>
+              <a:buNone/>
+            </a:pPr>
+            <a:r>
+              <a:rPr lang="en-US" dirty="0" smtClean="0"/>
+              <a:t>	Here’s a concise representation of some of  most used notations:</a:t>
+            </a:r>
           </a:p>
         </p:txBody>
       </p:sp>
@@ -4531,86 +4783,360 @@
           <a:p>
             <a:r>
               <a:rPr lang="en-US" dirty="0" smtClean="0"/>
-              <a:t>Runtime - Features</a:t>
+              <a:t>Intermediate Code</a:t>
             </a:r>
             <a:endParaRPr lang="en-US" dirty="0"/>
           </a:p>
         </p:txBody>
       </p:sp>
-      <p:sp>
-        <p:nvSpPr>
-          <p:cNvPr id="3" name="Content Placeholder 2"/>
-          <p:cNvSpPr>
-            <a:spLocks noGrp="1"/>
-          </p:cNvSpPr>
+      <p:graphicFrame>
+        <p:nvGraphicFramePr>
+          <p:cNvPr id="4" name="Content Placeholder 3"/>
+          <p:cNvGraphicFramePr>
+            <a:graphicFrameLocks noGrp="1"/>
+          </p:cNvGraphicFramePr>
           <p:nvPr>
             <p:ph idx="1"/>
           </p:nvPr>
-        </p:nvSpPr>
-        <p:spPr/>
-        <p:txBody>
-          <a:bodyPr>
-            <a:normAutofit fontScale="92500" lnSpcReduction="10000"/>
-          </a:bodyPr>
-          <a:lstStyle/>
-          <a:p>
-            <a:r>
-              <a:rPr lang="en-US" dirty="0" smtClean="0"/>
-              <a:t>RAMM’s Runtime is completely based on JAVA.</a:t>
-            </a:r>
-          </a:p>
-          <a:p>
-            <a:endParaRPr lang="en-US" dirty="0" smtClean="0"/>
-          </a:p>
-          <a:p>
-            <a:r>
-              <a:rPr lang="en-US" dirty="0" smtClean="0"/>
-              <a:t>It is dynamically typed.</a:t>
-            </a:r>
-          </a:p>
-          <a:p>
-            <a:endParaRPr lang="en-US" dirty="0" smtClean="0"/>
-          </a:p>
-          <a:p>
-            <a:r>
-              <a:rPr lang="en-US" dirty="0" smtClean="0"/>
-              <a:t>It internally uses stacks, linked lists and </a:t>
-            </a:r>
-            <a:r>
-              <a:rPr lang="en-US" dirty="0" err="1" smtClean="0"/>
-              <a:t>hashmaps</a:t>
-            </a:r>
-            <a:endParaRPr lang="en-US" dirty="0" smtClean="0"/>
-          </a:p>
-          <a:p>
-            <a:endParaRPr lang="en-US" dirty="0" smtClean="0"/>
-          </a:p>
-          <a:p>
-            <a:r>
-              <a:rPr lang="en-US" dirty="0" smtClean="0"/>
-              <a:t>The intermediate code is in prefix notation and the runtime is designed accordingly to process prefix expressions</a:t>
-            </a:r>
-          </a:p>
-          <a:p>
-            <a:endParaRPr lang="en-US" dirty="0" smtClean="0"/>
-          </a:p>
-          <a:p>
-            <a:endParaRPr lang="en-US" dirty="0" smtClean="0"/>
-          </a:p>
-          <a:p>
-            <a:endParaRPr lang="en-US" dirty="0" smtClean="0"/>
-          </a:p>
-          <a:p>
-            <a:endParaRPr lang="en-US" dirty="0"/>
-          </a:p>
-        </p:txBody>
-      </p:sp>
+        </p:nvGraphicFramePr>
+        <p:xfrm>
+          <a:off x="457200" y="1371600"/>
+          <a:ext cx="8305800" cy="5048250"/>
+        </p:xfrm>
+        <a:graphic>
+          <a:graphicData uri="http://schemas.openxmlformats.org/drawingml/2006/table">
+            <a:tbl>
+              <a:tblPr firstRow="1" bandRow="1">
+                <a:tableStyleId>{5C22544A-7EE6-4342-B048-85BDC9FD1C3A}</a:tableStyleId>
+              </a:tblPr>
+              <a:tblGrid>
+                <a:gridCol w="4152900"/>
+                <a:gridCol w="4152900"/>
+              </a:tblGrid>
+              <a:tr h="504825">
+                <a:tc>
+                  <a:txBody>
+                    <a:bodyPr/>
+                    <a:lstStyle/>
+                    <a:p>
+                      <a:pPr algn="ctr"/>
+                      <a:r>
+                        <a:rPr lang="en-US" dirty="0" smtClean="0"/>
+                        <a:t>Action</a:t>
+                      </a:r>
+                      <a:endParaRPr lang="en-US" dirty="0"/>
+                    </a:p>
+                  </a:txBody>
+                  <a:tcPr/>
+                </a:tc>
+                <a:tc>
+                  <a:txBody>
+                    <a:bodyPr/>
+                    <a:lstStyle/>
+                    <a:p>
+                      <a:pPr algn="ctr"/>
+                      <a:r>
+                        <a:rPr lang="en-US" dirty="0" smtClean="0"/>
+                        <a:t>Notation</a:t>
+                      </a:r>
+                      <a:endParaRPr lang="en-US" dirty="0"/>
+                    </a:p>
+                  </a:txBody>
+                  <a:tcPr/>
+                </a:tc>
+              </a:tr>
+              <a:tr h="504825">
+                <a:tc>
+                  <a:txBody>
+                    <a:bodyPr/>
+                    <a:lstStyle/>
+                    <a:p>
+                      <a:pPr algn="ctr"/>
+                      <a:r>
+                        <a:rPr lang="en-US" dirty="0" smtClean="0"/>
+                        <a:t>&gt;</a:t>
+                      </a:r>
+                      <a:endParaRPr lang="en-US" dirty="0"/>
+                    </a:p>
+                  </a:txBody>
+                  <a:tcPr/>
+                </a:tc>
+                <a:tc>
+                  <a:txBody>
+                    <a:bodyPr/>
+                    <a:lstStyle/>
+                    <a:p>
+                      <a:pPr algn="ctr"/>
+                      <a:r>
+                        <a:rPr lang="en-US" dirty="0" smtClean="0"/>
+                        <a:t>GT</a:t>
+                      </a:r>
+                      <a:endParaRPr lang="en-US" dirty="0"/>
+                    </a:p>
+                  </a:txBody>
+                  <a:tcPr/>
+                </a:tc>
+              </a:tr>
+              <a:tr h="504825">
+                <a:tc>
+                  <a:txBody>
+                    <a:bodyPr/>
+                    <a:lstStyle/>
+                    <a:p>
+                      <a:pPr algn="ctr"/>
+                      <a:r>
+                        <a:rPr lang="en-US" dirty="0" smtClean="0"/>
+                        <a:t>&lt;</a:t>
+                      </a:r>
+                      <a:endParaRPr lang="en-US" dirty="0"/>
+                    </a:p>
+                  </a:txBody>
+                  <a:tcPr/>
+                </a:tc>
+                <a:tc>
+                  <a:txBody>
+                    <a:bodyPr/>
+                    <a:lstStyle/>
+                    <a:p>
+                      <a:pPr algn="ctr"/>
+                      <a:r>
+                        <a:rPr lang="en-US" dirty="0" smtClean="0"/>
+                        <a:t>LT</a:t>
+                      </a:r>
+                      <a:endParaRPr lang="en-US" dirty="0"/>
+                    </a:p>
+                  </a:txBody>
+                  <a:tcPr/>
+                </a:tc>
+              </a:tr>
+              <a:tr h="504825">
+                <a:tc>
+                  <a:txBody>
+                    <a:bodyPr/>
+                    <a:lstStyle/>
+                    <a:p>
+                      <a:pPr algn="ctr"/>
+                      <a:r>
+                        <a:rPr lang="en-US" dirty="0" smtClean="0"/>
+                        <a:t>&gt;=</a:t>
+                      </a:r>
+                      <a:endParaRPr lang="en-US" dirty="0"/>
+                    </a:p>
+                  </a:txBody>
+                  <a:tcPr/>
+                </a:tc>
+                <a:tc>
+                  <a:txBody>
+                    <a:bodyPr/>
+                    <a:lstStyle/>
+                    <a:p>
+                      <a:pPr algn="ctr"/>
+                      <a:r>
+                        <a:rPr lang="en-US" dirty="0" smtClean="0"/>
+                        <a:t>GE</a:t>
+                      </a:r>
+                    </a:p>
+                  </a:txBody>
+                  <a:tcPr/>
+                </a:tc>
+              </a:tr>
+              <a:tr h="504825">
+                <a:tc>
+                  <a:txBody>
+                    <a:bodyPr/>
+                    <a:lstStyle/>
+                    <a:p>
+                      <a:pPr algn="ctr"/>
+                      <a:r>
+                        <a:rPr lang="en-US" dirty="0" smtClean="0"/>
+                        <a:t>&lt;=</a:t>
+                      </a:r>
+                      <a:endParaRPr lang="en-US" dirty="0"/>
+                    </a:p>
+                  </a:txBody>
+                  <a:tcPr/>
+                </a:tc>
+                <a:tc>
+                  <a:txBody>
+                    <a:bodyPr/>
+                    <a:lstStyle/>
+                    <a:p>
+                      <a:pPr algn="ctr"/>
+                      <a:r>
+                        <a:rPr lang="en-US" dirty="0" smtClean="0"/>
+                        <a:t>LE</a:t>
+                      </a:r>
+                      <a:endParaRPr lang="en-US" dirty="0"/>
+                    </a:p>
+                  </a:txBody>
+                  <a:tcPr/>
+                </a:tc>
+              </a:tr>
+              <a:tr h="504825">
+                <a:tc>
+                  <a:txBody>
+                    <a:bodyPr/>
+                    <a:lstStyle/>
+                    <a:p>
+                      <a:pPr algn="ctr"/>
+                      <a:r>
+                        <a:rPr lang="en-US" dirty="0" smtClean="0"/>
+                        <a:t>==</a:t>
+                      </a:r>
+                      <a:endParaRPr lang="en-US" dirty="0"/>
+                    </a:p>
+                  </a:txBody>
+                  <a:tcPr/>
+                </a:tc>
+                <a:tc>
+                  <a:txBody>
+                    <a:bodyPr/>
+                    <a:lstStyle/>
+                    <a:p>
+                      <a:pPr algn="ctr"/>
+                      <a:r>
+                        <a:rPr lang="en-US" dirty="0" smtClean="0"/>
+                        <a:t>E</a:t>
+                      </a:r>
+                      <a:endParaRPr lang="en-US" dirty="0"/>
+                    </a:p>
+                  </a:txBody>
+                  <a:tcPr/>
+                </a:tc>
+              </a:tr>
+              <a:tr h="504825">
+                <a:tc>
+                  <a:txBody>
+                    <a:bodyPr/>
+                    <a:lstStyle/>
+                    <a:p>
+                      <a:pPr algn="ctr"/>
+                      <a:r>
+                        <a:rPr lang="en-US" dirty="0" smtClean="0"/>
+                        <a:t>!=</a:t>
+                      </a:r>
+                      <a:endParaRPr lang="en-US" dirty="0"/>
+                    </a:p>
+                  </a:txBody>
+                  <a:tcPr/>
+                </a:tc>
+                <a:tc>
+                  <a:txBody>
+                    <a:bodyPr/>
+                    <a:lstStyle/>
+                    <a:p>
+                      <a:pPr algn="ctr"/>
+                      <a:r>
+                        <a:rPr lang="en-US" dirty="0" smtClean="0"/>
+                        <a:t>NE</a:t>
+                      </a:r>
+                      <a:endParaRPr lang="en-US" dirty="0"/>
+                    </a:p>
+                  </a:txBody>
+                  <a:tcPr/>
+                </a:tc>
+              </a:tr>
+              <a:tr h="504825">
+                <a:tc>
+                  <a:txBody>
+                    <a:bodyPr/>
+                    <a:lstStyle/>
+                    <a:p>
+                      <a:pPr algn="ctr"/>
+                      <a:r>
+                        <a:rPr lang="en-US" dirty="0" smtClean="0"/>
+                        <a:t>if()</a:t>
+                      </a:r>
+                      <a:endParaRPr lang="en-US" dirty="0"/>
+                    </a:p>
+                  </a:txBody>
+                  <a:tcPr/>
+                </a:tc>
+                <a:tc>
+                  <a:txBody>
+                    <a:bodyPr/>
+                    <a:lstStyle/>
+                    <a:p>
+                      <a:pPr algn="ctr"/>
+                      <a:r>
+                        <a:rPr lang="en-US" dirty="0" smtClean="0"/>
+                        <a:t>CHECK</a:t>
+                      </a:r>
+                      <a:endParaRPr lang="en-US" dirty="0"/>
+                    </a:p>
+                  </a:txBody>
+                  <a:tcPr/>
+                </a:tc>
+              </a:tr>
+              <a:tr h="504825">
+                <a:tc>
+                  <a:txBody>
+                    <a:bodyPr/>
+                    <a:lstStyle/>
+                    <a:p>
+                      <a:pPr algn="ctr"/>
+                      <a:r>
+                        <a:rPr lang="en-US" dirty="0" smtClean="0"/>
+                        <a:t>While()</a:t>
+                      </a:r>
+                      <a:endParaRPr lang="en-US" dirty="0"/>
+                    </a:p>
+                  </a:txBody>
+                  <a:tcPr/>
+                </a:tc>
+                <a:tc>
+                  <a:txBody>
+                    <a:bodyPr/>
+                    <a:lstStyle/>
+                    <a:p>
+                      <a:pPr algn="ctr"/>
+                      <a:r>
+                        <a:rPr lang="en-US" dirty="0" smtClean="0"/>
+                        <a:t>LOOP</a:t>
+                      </a:r>
+                      <a:endParaRPr lang="en-US" dirty="0"/>
+                    </a:p>
+                  </a:txBody>
+                  <a:tcPr/>
+                </a:tc>
+              </a:tr>
+              <a:tr h="504825">
+                <a:tc>
+                  <a:txBody>
+                    <a:bodyPr/>
+                    <a:lstStyle/>
+                    <a:p>
+                      <a:pPr algn="ctr"/>
+                      <a:r>
+                        <a:rPr lang="en-US" dirty="0" smtClean="0"/>
+                        <a:t>Function call</a:t>
+                      </a:r>
+                      <a:endParaRPr lang="en-US" dirty="0"/>
+                    </a:p>
+                  </a:txBody>
+                  <a:tcPr/>
+                </a:tc>
+                <a:tc>
+                  <a:txBody>
+                    <a:bodyPr/>
+                    <a:lstStyle/>
+                    <a:p>
+                      <a:pPr algn="ctr"/>
+                      <a:r>
+                        <a:rPr lang="en-US" dirty="0" smtClean="0"/>
+                        <a:t>LOAD</a:t>
+                      </a:r>
+                      <a:endParaRPr lang="en-US" dirty="0"/>
+                    </a:p>
+                  </a:txBody>
+                  <a:tcPr/>
+                </a:tc>
+              </a:tr>
+            </a:tbl>
+          </a:graphicData>
+        </a:graphic>
+      </p:graphicFrame>
     </p:spTree>
-    <p:extLst>
-      <p:ext uri="{BB962C8B-B14F-4D97-AF65-F5344CB8AC3E}">
-        <p14:creationId xmlns:p14="http://schemas.microsoft.com/office/powerpoint/2010/main" val="1488794544"/>
-      </p:ext>
-    </p:extLst>
   </p:cSld>
   <p:clrMapOvr>
     <a:masterClrMapping/>

</xml_diff>